<commit_message>
Folie für die Vorstellungs-Präsentation eingefügt
</commit_message>
<xml_diff>
--- a/Präsentation/KA-Share.pptx
+++ b/Präsentation/KA-Share.pptx
@@ -613,7 +613,7 @@
           <a:p>
             <a:fld id="{D1AEE69C-A511-489D-9735-98F84310A8BC}" type="datetimeFigureOut">
               <a:rPr lang="de-DE" smtClean="0"/>
-              <a:t>08.02.2019</a:t>
+              <a:t>10.02.2019</a:t>
             </a:fld>
             <a:endParaRPr lang="de-DE"/>
           </a:p>
@@ -6826,7 +6826,13 @@
           <a:bodyPr/>
           <a:lstStyle/>
           <a:p>
-            <a:endParaRPr lang="de-DE"/>
+            <a:r>
+              <a:rPr lang="de-DE" b="1" dirty="0"/>
+              <a:t>Programmierer.</a:t>
+            </a:r>
+          </a:p>
+          <a:p>
+            <a:endParaRPr lang="de-DE" dirty="0"/>
           </a:p>
         </p:txBody>
       </p:sp>
@@ -6954,6 +6960,975 @@
           </a:p>
         </p:txBody>
       </p:sp>
+      <p:grpSp>
+        <p:nvGrpSpPr>
+          <p:cNvPr id="10" name="Gruppieren 9">
+            <a:extLst>
+              <a:ext uri="{FF2B5EF4-FFF2-40B4-BE49-F238E27FC236}">
+                <a16:creationId xmlns:a16="http://schemas.microsoft.com/office/drawing/2014/main" id="{07617A49-886C-4502-80EE-C73A6FA606F2}"/>
+              </a:ext>
+            </a:extLst>
+          </p:cNvPr>
+          <p:cNvGrpSpPr/>
+          <p:nvPr/>
+        </p:nvGrpSpPr>
+        <p:grpSpPr>
+          <a:xfrm>
+            <a:off x="682622" y="509343"/>
+            <a:ext cx="4893770" cy="3899072"/>
+            <a:chOff x="682622" y="509343"/>
+            <a:chExt cx="4893770" cy="3899072"/>
+          </a:xfrm>
+        </p:grpSpPr>
+        <p:sp>
+          <p:nvSpPr>
+            <p:cNvPr id="8" name="Textplatzhalter 4">
+              <a:extLst>
+                <a:ext uri="{FF2B5EF4-FFF2-40B4-BE49-F238E27FC236}">
+                  <a16:creationId xmlns:a16="http://schemas.microsoft.com/office/drawing/2014/main" id="{F46F9C9A-0A39-4C5F-A154-DF2EC4D9A58C}"/>
+                </a:ext>
+              </a:extLst>
+            </p:cNvPr>
+            <p:cNvSpPr txBox="1">
+              <a:spLocks/>
+            </p:cNvSpPr>
+            <p:nvPr/>
+          </p:nvSpPr>
+          <p:spPr>
+            <a:xfrm>
+              <a:off x="682622" y="515924"/>
+              <a:ext cx="2123495" cy="3837962"/>
+            </a:xfrm>
+            <a:prstGeom prst="rect">
+              <a:avLst/>
+            </a:prstGeom>
+          </p:spPr>
+          <p:txBody>
+            <a:bodyPr vert="horz" lIns="91440" tIns="45720" rIns="91440" bIns="45720" rtlCol="0" anchor="t">
+              <a:normAutofit/>
+            </a:bodyPr>
+            <a:lstStyle>
+              <a:lvl1pPr marL="0" indent="0" algn="l" defTabSz="457200" rtl="0" eaLnBrk="1" latinLnBrk="0" hangingPunct="1">
+                <a:spcBef>
+                  <a:spcPct val="20000"/>
+                </a:spcBef>
+                <a:spcAft>
+                  <a:spcPts val="600"/>
+                </a:spcAft>
+                <a:buClr>
+                  <a:schemeClr val="tx1"/>
+                </a:buClr>
+                <a:buSzPct val="80000"/>
+                <a:buFont typeface="Wingdings 3" panose="05040102010807070707" pitchFamily="18" charset="2"/>
+                <a:buNone/>
+                <a:defRPr sz="2000" kern="1200" cap="none">
+                  <a:solidFill>
+                    <a:schemeClr val="bg2">
+                      <a:lumMod val="75000"/>
+                    </a:schemeClr>
+                  </a:solidFill>
+                  <a:effectLst/>
+                  <a:latin typeface="+mn-lt"/>
+                  <a:ea typeface="+mn-ea"/>
+                  <a:cs typeface="+mn-cs"/>
+                </a:defRPr>
+              </a:lvl1pPr>
+              <a:lvl2pPr marL="457200" indent="0" algn="l" defTabSz="457200" rtl="0" eaLnBrk="1" latinLnBrk="0" hangingPunct="1">
+                <a:spcBef>
+                  <a:spcPct val="20000"/>
+                </a:spcBef>
+                <a:spcAft>
+                  <a:spcPts val="600"/>
+                </a:spcAft>
+                <a:buClr>
+                  <a:schemeClr val="tx1"/>
+                </a:buClr>
+                <a:buSzPct val="80000"/>
+                <a:buFont typeface="Wingdings 3" panose="05040102010807070707" pitchFamily="18" charset="2"/>
+                <a:buNone/>
+                <a:defRPr sz="1800" kern="1200" cap="none">
+                  <a:solidFill>
+                    <a:schemeClr val="tx1">
+                      <a:tint val="75000"/>
+                    </a:schemeClr>
+                  </a:solidFill>
+                  <a:effectLst/>
+                  <a:latin typeface="+mn-lt"/>
+                  <a:ea typeface="+mn-ea"/>
+                  <a:cs typeface="+mn-cs"/>
+                </a:defRPr>
+              </a:lvl2pPr>
+              <a:lvl3pPr marL="914400" indent="0" algn="l" defTabSz="457200" rtl="0" eaLnBrk="1" latinLnBrk="0" hangingPunct="1">
+                <a:spcBef>
+                  <a:spcPct val="20000"/>
+                </a:spcBef>
+                <a:spcAft>
+                  <a:spcPts val="600"/>
+                </a:spcAft>
+                <a:buClr>
+                  <a:schemeClr val="tx1"/>
+                </a:buClr>
+                <a:buSzPct val="80000"/>
+                <a:buFont typeface="Wingdings 3" panose="05040102010807070707" pitchFamily="18" charset="2"/>
+                <a:buNone/>
+                <a:defRPr sz="1600" kern="1200" cap="none">
+                  <a:solidFill>
+                    <a:schemeClr val="tx1">
+                      <a:tint val="75000"/>
+                    </a:schemeClr>
+                  </a:solidFill>
+                  <a:effectLst/>
+                  <a:latin typeface="+mn-lt"/>
+                  <a:ea typeface="+mn-ea"/>
+                  <a:cs typeface="+mn-cs"/>
+                </a:defRPr>
+              </a:lvl3pPr>
+              <a:lvl4pPr marL="1371600" indent="0" algn="l" defTabSz="457200" rtl="0" eaLnBrk="1" latinLnBrk="0" hangingPunct="1">
+                <a:spcBef>
+                  <a:spcPct val="20000"/>
+                </a:spcBef>
+                <a:spcAft>
+                  <a:spcPts val="600"/>
+                </a:spcAft>
+                <a:buClr>
+                  <a:schemeClr val="tx1"/>
+                </a:buClr>
+                <a:buSzPct val="80000"/>
+                <a:buFont typeface="Wingdings 3" panose="05040102010807070707" pitchFamily="18" charset="2"/>
+                <a:buNone/>
+                <a:defRPr sz="1400" kern="1200" cap="none">
+                  <a:solidFill>
+                    <a:schemeClr val="tx1">
+                      <a:tint val="75000"/>
+                    </a:schemeClr>
+                  </a:solidFill>
+                  <a:effectLst/>
+                  <a:latin typeface="+mn-lt"/>
+                  <a:ea typeface="+mn-ea"/>
+                  <a:cs typeface="+mn-cs"/>
+                </a:defRPr>
+              </a:lvl4pPr>
+              <a:lvl5pPr marL="1828800" indent="0" algn="l" defTabSz="457200" rtl="0" eaLnBrk="1" latinLnBrk="0" hangingPunct="1">
+                <a:spcBef>
+                  <a:spcPct val="20000"/>
+                </a:spcBef>
+                <a:spcAft>
+                  <a:spcPts val="600"/>
+                </a:spcAft>
+                <a:buClr>
+                  <a:schemeClr val="tx1"/>
+                </a:buClr>
+                <a:buSzPct val="80000"/>
+                <a:buFont typeface="Wingdings 3" panose="05040102010807070707" pitchFamily="18" charset="2"/>
+                <a:buNone/>
+                <a:defRPr sz="1400" kern="1200" cap="none">
+                  <a:solidFill>
+                    <a:schemeClr val="tx1">
+                      <a:tint val="75000"/>
+                    </a:schemeClr>
+                  </a:solidFill>
+                  <a:effectLst/>
+                  <a:latin typeface="+mn-lt"/>
+                  <a:ea typeface="+mn-ea"/>
+                  <a:cs typeface="+mn-cs"/>
+                </a:defRPr>
+              </a:lvl5pPr>
+              <a:lvl6pPr marL="2286000" indent="0" algn="l" defTabSz="457200" rtl="0" eaLnBrk="1" latinLnBrk="0" hangingPunct="1">
+                <a:spcBef>
+                  <a:spcPct val="20000"/>
+                </a:spcBef>
+                <a:spcAft>
+                  <a:spcPts val="600"/>
+                </a:spcAft>
+                <a:buClr>
+                  <a:schemeClr val="tx1"/>
+                </a:buClr>
+                <a:buSzPct val="80000"/>
+                <a:buFont typeface="Wingdings 3" panose="05040102010807070707" pitchFamily="18" charset="2"/>
+                <a:buNone/>
+                <a:defRPr sz="1400" kern="1200" cap="none">
+                  <a:solidFill>
+                    <a:schemeClr val="tx1">
+                      <a:tint val="75000"/>
+                    </a:schemeClr>
+                  </a:solidFill>
+                  <a:effectLst/>
+                  <a:latin typeface="+mn-lt"/>
+                  <a:ea typeface="+mn-ea"/>
+                  <a:cs typeface="+mn-cs"/>
+                </a:defRPr>
+              </a:lvl6pPr>
+              <a:lvl7pPr marL="2743200" indent="0" algn="l" defTabSz="457200" rtl="0" eaLnBrk="1" latinLnBrk="0" hangingPunct="1">
+                <a:spcBef>
+                  <a:spcPct val="20000"/>
+                </a:spcBef>
+                <a:spcAft>
+                  <a:spcPts val="600"/>
+                </a:spcAft>
+                <a:buClr>
+                  <a:schemeClr val="tx1"/>
+                </a:buClr>
+                <a:buSzPct val="80000"/>
+                <a:buFont typeface="Wingdings 3" panose="05040102010807070707" pitchFamily="18" charset="2"/>
+                <a:buNone/>
+                <a:defRPr sz="1400" kern="1200" cap="none">
+                  <a:solidFill>
+                    <a:schemeClr val="tx1">
+                      <a:tint val="75000"/>
+                    </a:schemeClr>
+                  </a:solidFill>
+                  <a:effectLst/>
+                  <a:latin typeface="+mn-lt"/>
+                  <a:ea typeface="+mn-ea"/>
+                  <a:cs typeface="+mn-cs"/>
+                </a:defRPr>
+              </a:lvl7pPr>
+              <a:lvl8pPr marL="3200400" indent="0" algn="l" defTabSz="457200" rtl="0" eaLnBrk="1" latinLnBrk="0" hangingPunct="1">
+                <a:spcBef>
+                  <a:spcPct val="20000"/>
+                </a:spcBef>
+                <a:spcAft>
+                  <a:spcPts val="600"/>
+                </a:spcAft>
+                <a:buClr>
+                  <a:schemeClr val="tx1"/>
+                </a:buClr>
+                <a:buSzPct val="80000"/>
+                <a:buFont typeface="Wingdings 3" panose="05040102010807070707" pitchFamily="18" charset="2"/>
+                <a:buNone/>
+                <a:defRPr sz="1400" kern="1200" cap="none">
+                  <a:solidFill>
+                    <a:schemeClr val="tx1">
+                      <a:tint val="75000"/>
+                    </a:schemeClr>
+                  </a:solidFill>
+                  <a:effectLst/>
+                  <a:latin typeface="+mn-lt"/>
+                  <a:ea typeface="+mn-ea"/>
+                  <a:cs typeface="+mn-cs"/>
+                </a:defRPr>
+              </a:lvl8pPr>
+              <a:lvl9pPr marL="3657600" indent="0" algn="l" defTabSz="457200" rtl="0" eaLnBrk="1" latinLnBrk="0" hangingPunct="1">
+                <a:spcBef>
+                  <a:spcPct val="20000"/>
+                </a:spcBef>
+                <a:spcAft>
+                  <a:spcPts val="600"/>
+                </a:spcAft>
+                <a:buClr>
+                  <a:schemeClr val="tx1"/>
+                </a:buClr>
+                <a:buSzPct val="80000"/>
+                <a:buFont typeface="Wingdings 3" panose="05040102010807070707" pitchFamily="18" charset="2"/>
+                <a:buNone/>
+                <a:defRPr sz="1400" kern="1200" cap="none">
+                  <a:solidFill>
+                    <a:schemeClr val="tx1">
+                      <a:tint val="75000"/>
+                    </a:schemeClr>
+                  </a:solidFill>
+                  <a:effectLst/>
+                  <a:latin typeface="+mn-lt"/>
+                  <a:ea typeface="+mn-ea"/>
+                  <a:cs typeface="+mn-cs"/>
+                </a:defRPr>
+              </a:lvl9pPr>
+            </a:lstStyle>
+            <a:p>
+              <a:r>
+                <a:rPr lang="de-DE" sz="1800" dirty="0">
+                  <a:solidFill>
+                    <a:schemeClr val="tx1"/>
+                  </a:solidFill>
+                </a:rPr>
+                <a:t>Reisen:</a:t>
+              </a:r>
+            </a:p>
+            <a:p>
+              <a:pPr lvl="1"/>
+              <a:endParaRPr lang="de-DE" dirty="0">
+                <a:solidFill>
+                  <a:schemeClr val="tx1"/>
+                </a:solidFill>
+              </a:endParaRPr>
+            </a:p>
+            <a:p>
+              <a:pPr marL="800100" lvl="1" indent="-342900">
+                <a:buFontTx/>
+                <a:buChar char="-"/>
+              </a:pPr>
+              <a:endParaRPr lang="de-DE" dirty="0">
+                <a:solidFill>
+                  <a:schemeClr val="tx1"/>
+                </a:solidFill>
+              </a:endParaRPr>
+            </a:p>
+            <a:p>
+              <a:endParaRPr lang="de-DE" sz="1800" dirty="0">
+                <a:solidFill>
+                  <a:schemeClr val="tx1"/>
+                </a:solidFill>
+              </a:endParaRPr>
+            </a:p>
+            <a:p>
+              <a:r>
+                <a:rPr lang="de-DE" sz="1800" dirty="0">
+                  <a:solidFill>
+                    <a:schemeClr val="tx1"/>
+                  </a:solidFill>
+                </a:rPr>
+                <a:t>Sport:</a:t>
+              </a:r>
+            </a:p>
+            <a:p>
+              <a:pPr lvl="1"/>
+              <a:r>
+                <a:rPr lang="de-DE" dirty="0">
+                  <a:solidFill>
+                    <a:schemeClr val="tx1"/>
+                  </a:solidFill>
+                </a:rPr>
+                <a:t> </a:t>
+              </a:r>
+            </a:p>
+            <a:p>
+              <a:pPr lvl="1"/>
+              <a:endParaRPr lang="de-DE" dirty="0">
+                <a:solidFill>
+                  <a:schemeClr val="tx1"/>
+                </a:solidFill>
+              </a:endParaRPr>
+            </a:p>
+            <a:p>
+              <a:r>
+                <a:rPr lang="de-DE" sz="1800" dirty="0">
+                  <a:solidFill>
+                    <a:schemeClr val="tx1"/>
+                  </a:solidFill>
+                </a:rPr>
+                <a:t>Freizeitparks: </a:t>
+              </a:r>
+            </a:p>
+          </p:txBody>
+        </p:sp>
+        <p:sp>
+          <p:nvSpPr>
+            <p:cNvPr id="9" name="Textplatzhalter 4">
+              <a:extLst>
+                <a:ext uri="{FF2B5EF4-FFF2-40B4-BE49-F238E27FC236}">
+                  <a16:creationId xmlns:a16="http://schemas.microsoft.com/office/drawing/2014/main" id="{103C2607-0469-4879-914F-6B58FBEF5679}"/>
+                </a:ext>
+              </a:extLst>
+            </p:cNvPr>
+            <p:cNvSpPr txBox="1">
+              <a:spLocks/>
+            </p:cNvSpPr>
+            <p:nvPr/>
+          </p:nvSpPr>
+          <p:spPr>
+            <a:xfrm>
+              <a:off x="2559469" y="509343"/>
+              <a:ext cx="3016923" cy="3899072"/>
+            </a:xfrm>
+            <a:prstGeom prst="rect">
+              <a:avLst/>
+            </a:prstGeom>
+          </p:spPr>
+          <p:txBody>
+            <a:bodyPr vert="horz" lIns="91440" tIns="45720" rIns="91440" bIns="45720" rtlCol="0" anchor="t">
+              <a:normAutofit/>
+            </a:bodyPr>
+            <a:lstStyle>
+              <a:lvl1pPr marL="0" indent="0" algn="l" defTabSz="457200" rtl="0" eaLnBrk="1" latinLnBrk="0" hangingPunct="1">
+                <a:spcBef>
+                  <a:spcPct val="20000"/>
+                </a:spcBef>
+                <a:spcAft>
+                  <a:spcPts val="600"/>
+                </a:spcAft>
+                <a:buClr>
+                  <a:schemeClr val="tx1"/>
+                </a:buClr>
+                <a:buSzPct val="80000"/>
+                <a:buFont typeface="Wingdings 3" panose="05040102010807070707" pitchFamily="18" charset="2"/>
+                <a:buNone/>
+                <a:defRPr sz="2000" kern="1200" cap="none">
+                  <a:solidFill>
+                    <a:schemeClr val="bg2">
+                      <a:lumMod val="75000"/>
+                    </a:schemeClr>
+                  </a:solidFill>
+                  <a:effectLst/>
+                  <a:latin typeface="+mn-lt"/>
+                  <a:ea typeface="+mn-ea"/>
+                  <a:cs typeface="+mn-cs"/>
+                </a:defRPr>
+              </a:lvl1pPr>
+              <a:lvl2pPr marL="457200" indent="0" algn="l" defTabSz="457200" rtl="0" eaLnBrk="1" latinLnBrk="0" hangingPunct="1">
+                <a:spcBef>
+                  <a:spcPct val="20000"/>
+                </a:spcBef>
+                <a:spcAft>
+                  <a:spcPts val="600"/>
+                </a:spcAft>
+                <a:buClr>
+                  <a:schemeClr val="tx1"/>
+                </a:buClr>
+                <a:buSzPct val="80000"/>
+                <a:buFont typeface="Wingdings 3" panose="05040102010807070707" pitchFamily="18" charset="2"/>
+                <a:buNone/>
+                <a:defRPr sz="1800" kern="1200" cap="none">
+                  <a:solidFill>
+                    <a:schemeClr val="tx1">
+                      <a:tint val="75000"/>
+                    </a:schemeClr>
+                  </a:solidFill>
+                  <a:effectLst/>
+                  <a:latin typeface="+mn-lt"/>
+                  <a:ea typeface="+mn-ea"/>
+                  <a:cs typeface="+mn-cs"/>
+                </a:defRPr>
+              </a:lvl2pPr>
+              <a:lvl3pPr marL="914400" indent="0" algn="l" defTabSz="457200" rtl="0" eaLnBrk="1" latinLnBrk="0" hangingPunct="1">
+                <a:spcBef>
+                  <a:spcPct val="20000"/>
+                </a:spcBef>
+                <a:spcAft>
+                  <a:spcPts val="600"/>
+                </a:spcAft>
+                <a:buClr>
+                  <a:schemeClr val="tx1"/>
+                </a:buClr>
+                <a:buSzPct val="80000"/>
+                <a:buFont typeface="Wingdings 3" panose="05040102010807070707" pitchFamily="18" charset="2"/>
+                <a:buNone/>
+                <a:defRPr sz="1600" kern="1200" cap="none">
+                  <a:solidFill>
+                    <a:schemeClr val="tx1">
+                      <a:tint val="75000"/>
+                    </a:schemeClr>
+                  </a:solidFill>
+                  <a:effectLst/>
+                  <a:latin typeface="+mn-lt"/>
+                  <a:ea typeface="+mn-ea"/>
+                  <a:cs typeface="+mn-cs"/>
+                </a:defRPr>
+              </a:lvl3pPr>
+              <a:lvl4pPr marL="1371600" indent="0" algn="l" defTabSz="457200" rtl="0" eaLnBrk="1" latinLnBrk="0" hangingPunct="1">
+                <a:spcBef>
+                  <a:spcPct val="20000"/>
+                </a:spcBef>
+                <a:spcAft>
+                  <a:spcPts val="600"/>
+                </a:spcAft>
+                <a:buClr>
+                  <a:schemeClr val="tx1"/>
+                </a:buClr>
+                <a:buSzPct val="80000"/>
+                <a:buFont typeface="Wingdings 3" panose="05040102010807070707" pitchFamily="18" charset="2"/>
+                <a:buNone/>
+                <a:defRPr sz="1400" kern="1200" cap="none">
+                  <a:solidFill>
+                    <a:schemeClr val="tx1">
+                      <a:tint val="75000"/>
+                    </a:schemeClr>
+                  </a:solidFill>
+                  <a:effectLst/>
+                  <a:latin typeface="+mn-lt"/>
+                  <a:ea typeface="+mn-ea"/>
+                  <a:cs typeface="+mn-cs"/>
+                </a:defRPr>
+              </a:lvl4pPr>
+              <a:lvl5pPr marL="1828800" indent="0" algn="l" defTabSz="457200" rtl="0" eaLnBrk="1" latinLnBrk="0" hangingPunct="1">
+                <a:spcBef>
+                  <a:spcPct val="20000"/>
+                </a:spcBef>
+                <a:spcAft>
+                  <a:spcPts val="600"/>
+                </a:spcAft>
+                <a:buClr>
+                  <a:schemeClr val="tx1"/>
+                </a:buClr>
+                <a:buSzPct val="80000"/>
+                <a:buFont typeface="Wingdings 3" panose="05040102010807070707" pitchFamily="18" charset="2"/>
+                <a:buNone/>
+                <a:defRPr sz="1400" kern="1200" cap="none">
+                  <a:solidFill>
+                    <a:schemeClr val="tx1">
+                      <a:tint val="75000"/>
+                    </a:schemeClr>
+                  </a:solidFill>
+                  <a:effectLst/>
+                  <a:latin typeface="+mn-lt"/>
+                  <a:ea typeface="+mn-ea"/>
+                  <a:cs typeface="+mn-cs"/>
+                </a:defRPr>
+              </a:lvl5pPr>
+              <a:lvl6pPr marL="2286000" indent="0" algn="l" defTabSz="457200" rtl="0" eaLnBrk="1" latinLnBrk="0" hangingPunct="1">
+                <a:spcBef>
+                  <a:spcPct val="20000"/>
+                </a:spcBef>
+                <a:spcAft>
+                  <a:spcPts val="600"/>
+                </a:spcAft>
+                <a:buClr>
+                  <a:schemeClr val="tx1"/>
+                </a:buClr>
+                <a:buSzPct val="80000"/>
+                <a:buFont typeface="Wingdings 3" panose="05040102010807070707" pitchFamily="18" charset="2"/>
+                <a:buNone/>
+                <a:defRPr sz="1400" kern="1200" cap="none">
+                  <a:solidFill>
+                    <a:schemeClr val="tx1">
+                      <a:tint val="75000"/>
+                    </a:schemeClr>
+                  </a:solidFill>
+                  <a:effectLst/>
+                  <a:latin typeface="+mn-lt"/>
+                  <a:ea typeface="+mn-ea"/>
+                  <a:cs typeface="+mn-cs"/>
+                </a:defRPr>
+              </a:lvl6pPr>
+              <a:lvl7pPr marL="2743200" indent="0" algn="l" defTabSz="457200" rtl="0" eaLnBrk="1" latinLnBrk="0" hangingPunct="1">
+                <a:spcBef>
+                  <a:spcPct val="20000"/>
+                </a:spcBef>
+                <a:spcAft>
+                  <a:spcPts val="600"/>
+                </a:spcAft>
+                <a:buClr>
+                  <a:schemeClr val="tx1"/>
+                </a:buClr>
+                <a:buSzPct val="80000"/>
+                <a:buFont typeface="Wingdings 3" panose="05040102010807070707" pitchFamily="18" charset="2"/>
+                <a:buNone/>
+                <a:defRPr sz="1400" kern="1200" cap="none">
+                  <a:solidFill>
+                    <a:schemeClr val="tx1">
+                      <a:tint val="75000"/>
+                    </a:schemeClr>
+                  </a:solidFill>
+                  <a:effectLst/>
+                  <a:latin typeface="+mn-lt"/>
+                  <a:ea typeface="+mn-ea"/>
+                  <a:cs typeface="+mn-cs"/>
+                </a:defRPr>
+              </a:lvl7pPr>
+              <a:lvl8pPr marL="3200400" indent="0" algn="l" defTabSz="457200" rtl="0" eaLnBrk="1" latinLnBrk="0" hangingPunct="1">
+                <a:spcBef>
+                  <a:spcPct val="20000"/>
+                </a:spcBef>
+                <a:spcAft>
+                  <a:spcPts val="600"/>
+                </a:spcAft>
+                <a:buClr>
+                  <a:schemeClr val="tx1"/>
+                </a:buClr>
+                <a:buSzPct val="80000"/>
+                <a:buFont typeface="Wingdings 3" panose="05040102010807070707" pitchFamily="18" charset="2"/>
+                <a:buNone/>
+                <a:defRPr sz="1400" kern="1200" cap="none">
+                  <a:solidFill>
+                    <a:schemeClr val="tx1">
+                      <a:tint val="75000"/>
+                    </a:schemeClr>
+                  </a:solidFill>
+                  <a:effectLst/>
+                  <a:latin typeface="+mn-lt"/>
+                  <a:ea typeface="+mn-ea"/>
+                  <a:cs typeface="+mn-cs"/>
+                </a:defRPr>
+              </a:lvl8pPr>
+              <a:lvl9pPr marL="3657600" indent="0" algn="l" defTabSz="457200" rtl="0" eaLnBrk="1" latinLnBrk="0" hangingPunct="1">
+                <a:spcBef>
+                  <a:spcPct val="20000"/>
+                </a:spcBef>
+                <a:spcAft>
+                  <a:spcPts val="600"/>
+                </a:spcAft>
+                <a:buClr>
+                  <a:schemeClr val="tx1"/>
+                </a:buClr>
+                <a:buSzPct val="80000"/>
+                <a:buFont typeface="Wingdings 3" panose="05040102010807070707" pitchFamily="18" charset="2"/>
+                <a:buNone/>
+                <a:defRPr sz="1400" kern="1200" cap="none">
+                  <a:solidFill>
+                    <a:schemeClr val="tx1">
+                      <a:tint val="75000"/>
+                    </a:schemeClr>
+                  </a:solidFill>
+                  <a:effectLst/>
+                  <a:latin typeface="+mn-lt"/>
+                  <a:ea typeface="+mn-ea"/>
+                  <a:cs typeface="+mn-cs"/>
+                </a:defRPr>
+              </a:lvl9pPr>
+            </a:lstStyle>
+            <a:p>
+              <a:pPr marL="800100" lvl="1" indent="-342900">
+                <a:buFontTx/>
+                <a:buChar char="-"/>
+              </a:pPr>
+              <a:r>
+                <a:rPr lang="de-DE" dirty="0">
+                  <a:solidFill>
+                    <a:schemeClr val="tx1"/>
+                  </a:solidFill>
+                </a:rPr>
+                <a:t>USA</a:t>
+              </a:r>
+            </a:p>
+            <a:p>
+              <a:pPr marL="800100" lvl="1" indent="-342900">
+                <a:buFontTx/>
+                <a:buChar char="-"/>
+              </a:pPr>
+              <a:r>
+                <a:rPr lang="de-DE" dirty="0">
+                  <a:solidFill>
+                    <a:schemeClr val="tx1"/>
+                  </a:solidFill>
+                </a:rPr>
+                <a:t>Mexiko</a:t>
+              </a:r>
+            </a:p>
+            <a:p>
+              <a:pPr marL="800100" lvl="1" indent="-342900">
+                <a:buFontTx/>
+                <a:buChar char="-"/>
+              </a:pPr>
+              <a:r>
+                <a:rPr lang="de-DE" dirty="0">
+                  <a:solidFill>
+                    <a:schemeClr val="tx1"/>
+                  </a:solidFill>
+                </a:rPr>
+                <a:t>Thailand</a:t>
+              </a:r>
+            </a:p>
+            <a:p>
+              <a:pPr lvl="1"/>
+              <a:endParaRPr lang="de-DE" dirty="0">
+                <a:solidFill>
+                  <a:schemeClr val="tx1"/>
+                </a:solidFill>
+              </a:endParaRPr>
+            </a:p>
+            <a:p>
+              <a:pPr marL="800100" lvl="1" indent="-342900">
+                <a:buFontTx/>
+                <a:buChar char="-"/>
+              </a:pPr>
+              <a:r>
+                <a:rPr lang="de-DE" dirty="0">
+                  <a:solidFill>
+                    <a:schemeClr val="tx1"/>
+                  </a:solidFill>
+                </a:rPr>
+                <a:t>Spinning </a:t>
+              </a:r>
+            </a:p>
+            <a:p>
+              <a:pPr marL="800100" lvl="1" indent="-342900">
+                <a:buFontTx/>
+                <a:buChar char="-"/>
+              </a:pPr>
+              <a:r>
+                <a:rPr lang="de-DE" dirty="0">
+                  <a:solidFill>
+                    <a:schemeClr val="tx1"/>
+                  </a:solidFill>
+                </a:rPr>
+                <a:t>Kraft-Ausdauer</a:t>
+              </a:r>
+            </a:p>
+            <a:p>
+              <a:pPr marL="800100" lvl="1" indent="-342900">
+                <a:buFontTx/>
+                <a:buChar char="-"/>
+              </a:pPr>
+              <a:endParaRPr lang="de-DE" dirty="0">
+                <a:solidFill>
+                  <a:schemeClr val="tx1"/>
+                </a:solidFill>
+              </a:endParaRPr>
+            </a:p>
+            <a:p>
+              <a:pPr marL="800100" lvl="1" indent="-342900">
+                <a:buFontTx/>
+                <a:buChar char="-"/>
+              </a:pPr>
+              <a:r>
+                <a:rPr lang="de-DE" dirty="0">
+                  <a:solidFill>
+                    <a:schemeClr val="tx1"/>
+                  </a:solidFill>
+                </a:rPr>
+                <a:t>10 Europa</a:t>
+              </a:r>
+            </a:p>
+            <a:p>
+              <a:pPr marL="800100" lvl="1" indent="-342900">
+                <a:buFontTx/>
+                <a:buChar char="-"/>
+              </a:pPr>
+              <a:r>
+                <a:rPr lang="de-DE" dirty="0">
+                  <a:solidFill>
+                    <a:schemeClr val="tx1"/>
+                  </a:solidFill>
+                </a:rPr>
+                <a:t>  8 USA</a:t>
+              </a:r>
+              <a:endParaRPr lang="de-DE" dirty="0"/>
+            </a:p>
+          </p:txBody>
+        </p:sp>
+      </p:grpSp>
+      <p:pic>
+        <p:nvPicPr>
+          <p:cNvPr id="12" name="Grafik 11" descr="Rad">
+            <a:extLst>
+              <a:ext uri="{FF2B5EF4-FFF2-40B4-BE49-F238E27FC236}">
+                <a16:creationId xmlns:a16="http://schemas.microsoft.com/office/drawing/2014/main" id="{51C8D45C-4EBC-4C59-BFF4-5061CBD01059}"/>
+              </a:ext>
+            </a:extLst>
+          </p:cNvPr>
+          <p:cNvPicPr>
+            <a:picLocks noChangeAspect="1"/>
+          </p:cNvPicPr>
+          <p:nvPr/>
+        </p:nvPicPr>
+        <p:blipFill>
+          <a:blip r:embed="rId4">
+            <a:extLst>
+              <a:ext uri="{96DAC541-7B7A-43D3-8B79-37D633B846F1}">
+                <asvg:svgBlip xmlns:asvg="http://schemas.microsoft.com/office/drawing/2016/SVG/main" r:embed="rId5"/>
+              </a:ext>
+            </a:extLst>
+          </a:blip>
+          <a:stretch>
+            <a:fillRect/>
+          </a:stretch>
+        </p:blipFill>
+        <p:spPr>
+          <a:xfrm>
+            <a:off x="8434004" y="2133302"/>
+            <a:ext cx="914400" cy="914400"/>
+          </a:xfrm>
+          <a:prstGeom prst="rect">
+            <a:avLst/>
+          </a:prstGeom>
+        </p:spPr>
+      </p:pic>
+      <p:pic>
+        <p:nvPicPr>
+          <p:cNvPr id="1026" name="Picture 2" descr="https://t4.ftcdn.net/jpg/01/09/49/03/240_F_109490336_58WJ0d4PJsZketWyxhin6zw3TNukh3Dd.jpg">
+            <a:extLst>
+              <a:ext uri="{FF2B5EF4-FFF2-40B4-BE49-F238E27FC236}">
+                <a16:creationId xmlns:a16="http://schemas.microsoft.com/office/drawing/2014/main" id="{20DEC696-1416-48E2-AE86-50B51CA7E1E1}"/>
+              </a:ext>
+            </a:extLst>
+          </p:cNvPr>
+          <p:cNvPicPr>
+            <a:picLocks noChangeAspect="1" noChangeArrowheads="1"/>
+          </p:cNvPicPr>
+          <p:nvPr/>
+        </p:nvPicPr>
+        <p:blipFill rotWithShape="1">
+          <a:blip r:embed="rId6">
+            <a:extLst>
+              <a:ext uri="{BEBA8EAE-BF5A-486C-A8C5-ECC9F3942E4B}">
+                <a14:imgProps xmlns:a14="http://schemas.microsoft.com/office/drawing/2010/main">
+                  <a14:imgLayer r:embed="rId7">
+                    <a14:imgEffect>
+                      <a14:backgroundRemoval t="14167" b="66250" l="9047" r="90307">
+                        <a14:foregroundMark x1="32633" y1="22917" x2="32633" y2="22917"/>
+                        <a14:foregroundMark x1="32956" y1="21250" x2="33603" y2="21250"/>
+                        <a14:foregroundMark x1="31664" y1="24167" x2="29402" y2="29583"/>
+                        <a14:foregroundMark x1="34087" y1="20417" x2="36026" y2="17083"/>
+                        <a14:foregroundMark x1="36511" y1="16667" x2="36834" y2="16250"/>
+                        <a14:foregroundMark x1="28756" y1="30417" x2="28433" y2="30833"/>
+                        <a14:foregroundMark x1="27464" y1="30417" x2="27464" y2="30417"/>
+                        <a14:foregroundMark x1="10662" y1="49583" x2="10662" y2="49583"/>
+                        <a14:foregroundMark x1="11955" y1="50000" x2="11955" y2="50000"/>
+                        <a14:foregroundMark x1="15186" y1="52500" x2="15186" y2="52500"/>
+                        <a14:foregroundMark x1="16640" y1="53750" x2="16640" y2="53750"/>
+                        <a14:foregroundMark x1="18094" y1="55833" x2="18094" y2="55833"/>
+                        <a14:foregroundMark x1="19386" y1="52500" x2="19386" y2="52500"/>
+                        <a14:foregroundMark x1="20840" y1="47917" x2="20840" y2="47917"/>
+                        <a14:foregroundMark x1="22456" y1="45417" x2="22456" y2="45417"/>
+                        <a14:foregroundMark x1="13570" y1="50417" x2="13570" y2="50417"/>
+                        <a14:foregroundMark x1="11793" y1="49167" x2="11793" y2="49167"/>
+                        <a14:foregroundMark x1="9370" y1="49167" x2="9370" y2="49167"/>
+                        <a14:foregroundMark x1="10662" y1="48333" x2="10662" y2="48333"/>
+                        <a14:foregroundMark x1="26333" y1="35833" x2="25202" y2="38333"/>
+                        <a14:foregroundMark x1="38126" y1="15833" x2="40226" y2="14167"/>
+                        <a14:foregroundMark x1="44265" y1="26250" x2="45234" y2="30833"/>
+                        <a14:foregroundMark x1="52666" y1="32500" x2="48304" y2="27917"/>
+                        <a14:foregroundMark x1="48304" y1="27917" x2="44265" y2="29167"/>
+                        <a14:foregroundMark x1="44265" y1="29167" x2="42003" y2="37917"/>
+                        <a14:foregroundMark x1="42003" y1="37917" x2="42811" y2="49167"/>
+                        <a14:foregroundMark x1="42811" y1="49167" x2="46688" y2="53750"/>
+                        <a14:foregroundMark x1="46688" y1="53750" x2="50889" y2="52083"/>
+                        <a14:foregroundMark x1="50889" y1="52083" x2="51858" y2="45000"/>
+                        <a14:foregroundMark x1="57189" y1="56250" x2="58643" y2="44583"/>
+                        <a14:foregroundMark x1="58643" y1="44583" x2="62036" y2="37917"/>
+                        <a14:foregroundMark x1="62036" y1="37917" x2="66236" y2="38333"/>
+                        <a14:foregroundMark x1="66236" y1="38333" x2="68659" y2="46667"/>
+                        <a14:foregroundMark x1="68659" y1="46667" x2="71082" y2="62917"/>
+                        <a14:foregroundMark x1="67044" y1="54583" x2="63005" y2="57083"/>
+                        <a14:foregroundMark x1="63005" y1="57083" x2="57997" y2="54583"/>
+                        <a14:foregroundMark x1="49919" y1="62083" x2="11632" y2="62083"/>
+                        <a14:foregroundMark x1="11632" y1="62083" x2="9208" y2="56667"/>
+                        <a14:foregroundMark x1="20840" y1="52500" x2="41842" y2="30833"/>
+                        <a14:foregroundMark x1="51696" y1="62917" x2="46850" y2="62500"/>
+                        <a14:foregroundMark x1="78675" y1="65833" x2="82714" y2="62500"/>
+                        <a14:foregroundMark x1="82714" y1="62500" x2="86914" y2="62917"/>
+                        <a14:foregroundMark x1="86914" y1="62917" x2="89661" y2="65417"/>
+                        <a14:foregroundMark x1="90307" y1="66250" x2="79645" y2="65417"/>
+                      </a14:backgroundRemoval>
+                    </a14:imgEffect>
+                  </a14:imgLayer>
+                </a14:imgProps>
+              </a:ext>
+              <a:ext uri="{28A0092B-C50C-407E-A947-70E740481C1C}">
+                <a14:useLocalDpi xmlns:a14="http://schemas.microsoft.com/office/drawing/2010/main" val="0"/>
+              </a:ext>
+            </a:extLst>
+          </a:blip>
+          <a:srcRect t="8653" b="28977"/>
+          <a:stretch/>
+        </p:blipFill>
+        <p:spPr bwMode="auto">
+          <a:xfrm>
+            <a:off x="5288990" y="3003625"/>
+            <a:ext cx="5247920" cy="1269058"/>
+          </a:xfrm>
+          <a:prstGeom prst="rect">
+            <a:avLst/>
+          </a:prstGeom>
+          <a:noFill/>
+          <a:extLst>
+            <a:ext uri="{909E8E84-426E-40DD-AFC4-6F175D3DCCD1}">
+              <a14:hiddenFill xmlns:a14="http://schemas.microsoft.com/office/drawing/2010/main">
+                <a:solidFill>
+                  <a:srgbClr val="FFFFFF"/>
+                </a:solidFill>
+              </a14:hiddenFill>
+            </a:ext>
+          </a:extLst>
+        </p:spPr>
+      </p:pic>
+      <p:pic>
+        <p:nvPicPr>
+          <p:cNvPr id="16" name="Grafik 15" descr="Palme">
+            <a:extLst>
+              <a:ext uri="{FF2B5EF4-FFF2-40B4-BE49-F238E27FC236}">
+                <a16:creationId xmlns:a16="http://schemas.microsoft.com/office/drawing/2014/main" id="{8A728D41-212E-4F11-9827-E30D00E0E6F3}"/>
+              </a:ext>
+            </a:extLst>
+          </p:cNvPr>
+          <p:cNvPicPr>
+            <a:picLocks noChangeAspect="1"/>
+          </p:cNvPicPr>
+          <p:nvPr/>
+        </p:nvPicPr>
+        <p:blipFill>
+          <a:blip r:embed="rId8">
+            <a:extLst>
+              <a:ext uri="{96DAC541-7B7A-43D3-8B79-37D633B846F1}">
+                <asvg:svgBlip xmlns:asvg="http://schemas.microsoft.com/office/drawing/2016/SVG/main" r:embed="rId9"/>
+              </a:ext>
+            </a:extLst>
+          </a:blip>
+          <a:stretch>
+            <a:fillRect/>
+          </a:stretch>
+        </p:blipFill>
+        <p:spPr>
+          <a:xfrm>
+            <a:off x="6220916" y="783433"/>
+            <a:ext cx="914400" cy="914400"/>
+          </a:xfrm>
+          <a:prstGeom prst="rect">
+            <a:avLst/>
+          </a:prstGeom>
+        </p:spPr>
+      </p:pic>
+      <p:pic>
+        <p:nvPicPr>
+          <p:cNvPr id="18" name="Grafik 17" descr="Erdkugel Amerika">
+            <a:extLst>
+              <a:ext uri="{FF2B5EF4-FFF2-40B4-BE49-F238E27FC236}">
+                <a16:creationId xmlns:a16="http://schemas.microsoft.com/office/drawing/2014/main" id="{562C6F40-F7D5-4C8A-B706-4BD3F0A554ED}"/>
+              </a:ext>
+            </a:extLst>
+          </p:cNvPr>
+          <p:cNvPicPr>
+            <a:picLocks noChangeAspect="1"/>
+          </p:cNvPicPr>
+          <p:nvPr/>
+        </p:nvPicPr>
+        <p:blipFill>
+          <a:blip r:embed="rId10">
+            <a:extLst>
+              <a:ext uri="{96DAC541-7B7A-43D3-8B79-37D633B846F1}">
+                <asvg:svgBlip xmlns:asvg="http://schemas.microsoft.com/office/drawing/2016/SVG/main" r:embed="rId11"/>
+              </a:ext>
+            </a:extLst>
+          </a:blip>
+          <a:stretch>
+            <a:fillRect/>
+          </a:stretch>
+        </p:blipFill>
+        <p:spPr>
+          <a:xfrm>
+            <a:off x="5513885" y="384884"/>
+            <a:ext cx="914400" cy="914400"/>
+          </a:xfrm>
+          <a:prstGeom prst="rect">
+            <a:avLst/>
+          </a:prstGeom>
+        </p:spPr>
+      </p:pic>
+      <p:pic>
+        <p:nvPicPr>
+          <p:cNvPr id="22" name="Grafik 21" descr="Wegweiser">
+            <a:extLst>
+              <a:ext uri="{FF2B5EF4-FFF2-40B4-BE49-F238E27FC236}">
+                <a16:creationId xmlns:a16="http://schemas.microsoft.com/office/drawing/2014/main" id="{2AECE126-588A-42A5-AE50-B5AEDBBBD249}"/>
+              </a:ext>
+            </a:extLst>
+          </p:cNvPr>
+          <p:cNvPicPr>
+            <a:picLocks noChangeAspect="1"/>
+          </p:cNvPicPr>
+          <p:nvPr/>
+        </p:nvPicPr>
+        <p:blipFill>
+          <a:blip r:embed="rId12">
+            <a:extLst>
+              <a:ext uri="{96DAC541-7B7A-43D3-8B79-37D633B846F1}">
+                <asvg:svgBlip xmlns:asvg="http://schemas.microsoft.com/office/drawing/2016/SVG/main" r:embed="rId13"/>
+              </a:ext>
+            </a:extLst>
+          </a:blip>
+          <a:stretch>
+            <a:fillRect/>
+          </a:stretch>
+        </p:blipFill>
+        <p:spPr>
+          <a:xfrm>
+            <a:off x="6722212" y="384884"/>
+            <a:ext cx="914400" cy="914400"/>
+          </a:xfrm>
+          <a:prstGeom prst="rect">
+            <a:avLst/>
+          </a:prstGeom>
+        </p:spPr>
+      </p:pic>
     </p:spTree>
     <p:extLst>
       <p:ext uri="{BB962C8B-B14F-4D97-AF65-F5344CB8AC3E}">

</xml_diff>

<commit_message>
Profil Dominik ergänzt durch Priktogramme
</commit_message>
<xml_diff>
--- a/Präsentation/KA-Share.pptx
+++ b/Präsentation/KA-Share.pptx
@@ -9024,6 +9024,13 @@
               </a:endParaRPr>
             </a:p>
             <a:p>
+              <a:endParaRPr lang="de-DE" sz="1800" dirty="0">
+                <a:solidFill>
+                  <a:schemeClr val="tx1"/>
+                </a:solidFill>
+              </a:endParaRPr>
+            </a:p>
+            <a:p>
               <a:r>
                 <a:rPr lang="de-DE" sz="1800" dirty="0">
                   <a:solidFill>
@@ -9381,6 +9388,20 @@
                 <a:buFontTx/>
                 <a:buChar char="-"/>
               </a:pPr>
+              <a:r>
+                <a:rPr lang="de-DE" dirty="0">
+                  <a:solidFill>
+                    <a:schemeClr val="tx1"/>
+                  </a:solidFill>
+                </a:rPr>
+                <a:t>Thriller</a:t>
+              </a:r>
+            </a:p>
+            <a:p>
+              <a:pPr marL="742950" lvl="1" indent="-285750">
+                <a:buFontTx/>
+                <a:buChar char="-"/>
+              </a:pPr>
               <a:endParaRPr lang="de-DE" dirty="0">
                 <a:solidFill>
                   <a:schemeClr val="tx1"/>
@@ -9418,6 +9439,186 @@
           </p:txBody>
         </p:sp>
       </p:grpSp>
+      <p:pic>
+        <p:nvPicPr>
+          <p:cNvPr id="12" name="Grafik 11" descr="Piano">
+            <a:extLst>
+              <a:ext uri="{FF2B5EF4-FFF2-40B4-BE49-F238E27FC236}">
+                <a16:creationId xmlns:a16="http://schemas.microsoft.com/office/drawing/2014/main" id="{13C7B735-DE97-40E4-9C66-880A375DEF71}"/>
+              </a:ext>
+            </a:extLst>
+          </p:cNvPr>
+          <p:cNvPicPr>
+            <a:picLocks noChangeAspect="1"/>
+          </p:cNvPicPr>
+          <p:nvPr/>
+        </p:nvPicPr>
+        <p:blipFill>
+          <a:blip r:embed="rId4">
+            <a:extLst>
+              <a:ext uri="{96DAC541-7B7A-43D3-8B79-37D633B846F1}">
+                <asvg:svgBlip xmlns:asvg="http://schemas.microsoft.com/office/drawing/2016/SVG/main" r:embed="rId5"/>
+              </a:ext>
+            </a:extLst>
+          </a:blip>
+          <a:stretch>
+            <a:fillRect/>
+          </a:stretch>
+        </p:blipFill>
+        <p:spPr>
+          <a:xfrm rot="834331">
+            <a:off x="6243773" y="705618"/>
+            <a:ext cx="938442" cy="938442"/>
+          </a:xfrm>
+          <a:prstGeom prst="rect">
+            <a:avLst/>
+          </a:prstGeom>
+        </p:spPr>
+      </p:pic>
+      <p:pic>
+        <p:nvPicPr>
+          <p:cNvPr id="14" name="Grafik 13" descr="Hantel">
+            <a:extLst>
+              <a:ext uri="{FF2B5EF4-FFF2-40B4-BE49-F238E27FC236}">
+                <a16:creationId xmlns:a16="http://schemas.microsoft.com/office/drawing/2014/main" id="{84923135-D6CE-4EB8-973A-397C118CFFC2}"/>
+              </a:ext>
+            </a:extLst>
+          </p:cNvPr>
+          <p:cNvPicPr>
+            <a:picLocks noChangeAspect="1"/>
+          </p:cNvPicPr>
+          <p:nvPr/>
+        </p:nvPicPr>
+        <p:blipFill>
+          <a:blip r:embed="rId6">
+            <a:extLst>
+              <a:ext uri="{96DAC541-7B7A-43D3-8B79-37D633B846F1}">
+                <asvg:svgBlip xmlns:asvg="http://schemas.microsoft.com/office/drawing/2016/SVG/main" r:embed="rId7"/>
+              </a:ext>
+            </a:extLst>
+          </a:blip>
+          <a:stretch>
+            <a:fillRect/>
+          </a:stretch>
+        </p:blipFill>
+        <p:spPr>
+          <a:xfrm>
+            <a:off x="8280170" y="402377"/>
+            <a:ext cx="938442" cy="938442"/>
+          </a:xfrm>
+          <a:prstGeom prst="rect">
+            <a:avLst/>
+          </a:prstGeom>
+        </p:spPr>
+      </p:pic>
+      <p:pic>
+        <p:nvPicPr>
+          <p:cNvPr id="16" name="Grafik 15" descr="Bücher">
+            <a:extLst>
+              <a:ext uri="{FF2B5EF4-FFF2-40B4-BE49-F238E27FC236}">
+                <a16:creationId xmlns:a16="http://schemas.microsoft.com/office/drawing/2014/main" id="{3F82CDFC-70ED-49D1-A170-2CBC5F157BA4}"/>
+              </a:ext>
+            </a:extLst>
+          </p:cNvPr>
+          <p:cNvPicPr>
+            <a:picLocks noChangeAspect="1"/>
+          </p:cNvPicPr>
+          <p:nvPr/>
+        </p:nvPicPr>
+        <p:blipFill>
+          <a:blip r:embed="rId8">
+            <a:extLst>
+              <a:ext uri="{96DAC541-7B7A-43D3-8B79-37D633B846F1}">
+                <asvg:svgBlip xmlns:asvg="http://schemas.microsoft.com/office/drawing/2016/SVG/main" r:embed="rId9"/>
+              </a:ext>
+            </a:extLst>
+          </a:blip>
+          <a:stretch>
+            <a:fillRect/>
+          </a:stretch>
+        </p:blipFill>
+        <p:spPr>
+          <a:xfrm rot="169271">
+            <a:off x="8302696" y="2248071"/>
+            <a:ext cx="938442" cy="938442"/>
+          </a:xfrm>
+          <a:prstGeom prst="rect">
+            <a:avLst/>
+          </a:prstGeom>
+        </p:spPr>
+      </p:pic>
+      <p:pic>
+        <p:nvPicPr>
+          <p:cNvPr id="18" name="Grafik 17" descr="Bücherregal">
+            <a:extLst>
+              <a:ext uri="{FF2B5EF4-FFF2-40B4-BE49-F238E27FC236}">
+                <a16:creationId xmlns:a16="http://schemas.microsoft.com/office/drawing/2014/main" id="{43B09446-56E3-4246-B7B2-442E5B6A75A6}"/>
+              </a:ext>
+            </a:extLst>
+          </p:cNvPr>
+          <p:cNvPicPr>
+            <a:picLocks noChangeAspect="1"/>
+          </p:cNvPicPr>
+          <p:nvPr/>
+        </p:nvPicPr>
+        <p:blipFill>
+          <a:blip r:embed="rId10">
+            <a:extLst>
+              <a:ext uri="{96DAC541-7B7A-43D3-8B79-37D633B846F1}">
+                <asvg:svgBlip xmlns:asvg="http://schemas.microsoft.com/office/drawing/2016/SVG/main" r:embed="rId11"/>
+              </a:ext>
+            </a:extLst>
+          </a:blip>
+          <a:stretch>
+            <a:fillRect/>
+          </a:stretch>
+        </p:blipFill>
+        <p:spPr>
+          <a:xfrm>
+            <a:off x="9727498" y="1965684"/>
+            <a:ext cx="938442" cy="938442"/>
+          </a:xfrm>
+          <a:prstGeom prst="rect">
+            <a:avLst/>
+          </a:prstGeom>
+        </p:spPr>
+      </p:pic>
+      <p:pic>
+        <p:nvPicPr>
+          <p:cNvPr id="20" name="Grafik 19" descr="Kamera">
+            <a:extLst>
+              <a:ext uri="{FF2B5EF4-FFF2-40B4-BE49-F238E27FC236}">
+                <a16:creationId xmlns:a16="http://schemas.microsoft.com/office/drawing/2014/main" id="{7528419F-C6CA-40BF-9EDA-2A03F5C6190F}"/>
+              </a:ext>
+            </a:extLst>
+          </p:cNvPr>
+          <p:cNvPicPr>
+            <a:picLocks noChangeAspect="1"/>
+          </p:cNvPicPr>
+          <p:nvPr/>
+        </p:nvPicPr>
+        <p:blipFill>
+          <a:blip r:embed="rId12">
+            <a:extLst>
+              <a:ext uri="{96DAC541-7B7A-43D3-8B79-37D633B846F1}">
+                <asvg:svgBlip xmlns:asvg="http://schemas.microsoft.com/office/drawing/2016/SVG/main" r:embed="rId13"/>
+              </a:ext>
+            </a:extLst>
+          </a:blip>
+          <a:stretch>
+            <a:fillRect/>
+          </a:stretch>
+        </p:blipFill>
+        <p:spPr>
+          <a:xfrm>
+            <a:off x="6713503" y="3415444"/>
+            <a:ext cx="938442" cy="938442"/>
+          </a:xfrm>
+          <a:prstGeom prst="rect">
+            <a:avLst/>
+          </a:prstGeom>
+        </p:spPr>
+      </p:pic>
     </p:spTree>
     <p:extLst>
       <p:ext uri="{BB962C8B-B14F-4D97-AF65-F5344CB8AC3E}">

</xml_diff>